<commit_message>
apresentação e relatório final
</commit_message>
<xml_diff>
--- a/docs/presentations/Apresentação final - 20211209.pptx
+++ b/docs/presentations/Apresentação final - 20211209.pptx
@@ -9056,8 +9056,8 @@
         </p:nvSpPr>
         <p:spPr>
           <a:xfrm>
-            <a:off x="5425082" y="4211340"/>
-            <a:ext cx="2926982" cy="523220"/>
+            <a:off x="5425081" y="4211340"/>
+            <a:ext cx="3177051" cy="738664"/>
           </a:xfrm>
           <a:prstGeom prst="rect">
             <a:avLst/>
@@ -9099,7 +9099,29 @@
                 </a:solidFill>
                 <a:latin typeface="Arial" panose="020B0604020202020204" pitchFamily="34" charset="0"/>
               </a:rPr>
-              <a:t>m resultados piores do que o BM25</a:t>
+              <a:t>m resultados maiores quartis de </a:t>
+            </a:r>
+            <a:r>
+              <a:rPr lang="pt-BR" dirty="0" err="1">
+                <a:solidFill>
+                  <a:schemeClr val="accent1">
+                    <a:lumMod val="75000"/>
+                  </a:schemeClr>
+                </a:solidFill>
+                <a:latin typeface="Arial" panose="020B0604020202020204" pitchFamily="34" charset="0"/>
+              </a:rPr>
+              <a:t>descont</a:t>
+            </a:r>
+            <a:r>
+              <a:rPr lang="pt-BR" dirty="0">
+                <a:solidFill>
+                  <a:schemeClr val="accent1">
+                    <a:lumMod val="75000"/>
+                  </a:schemeClr>
+                </a:solidFill>
+                <a:latin typeface="Arial" panose="020B0604020202020204" pitchFamily="34" charset="0"/>
+              </a:rPr>
+              <a:t> do que o BM25</a:t>
             </a:r>
             <a:endParaRPr lang="pt-BR" b="0" dirty="0">
               <a:solidFill>

</xml_diff>